<commit_message>
data for Jessie with Monocle
</commit_message>
<xml_diff>
--- a/Figures/workflow.pptx
+++ b/Figures/workflow.pptx
@@ -104,6 +104,11 @@
       </a:defRPr>
     </a:lvl9pPr>
   </p:defaultTextStyle>
+  <p:extLst>
+    <p:ext uri="{EFAFB233-063F-42B5-8137-9DF3F51BA10A}">
+      <p15:sldGuideLst xmlns:p15="http://schemas.microsoft.com/office/powerpoint/2012/main"/>
+    </p:ext>
+  </p:extLst>
 </p:presentation>
 </file>
 
@@ -254,7 +259,7 @@
           <a:p>
             <a:fld id="{8BCF4D5A-B8DA-0B42-B122-40B606B4BD95}" type="datetimeFigureOut">
               <a:rPr lang="en-US" smtClean="0"/>
-              <a:t>2/13/19</a:t>
+              <a:t>5/9/19</a:t>
             </a:fld>
             <a:endParaRPr lang="en-US"/>
           </a:p>
@@ -452,7 +457,7 @@
           <a:p>
             <a:fld id="{8BCF4D5A-B8DA-0B42-B122-40B606B4BD95}" type="datetimeFigureOut">
               <a:rPr lang="en-US" smtClean="0"/>
-              <a:t>2/13/19</a:t>
+              <a:t>5/9/19</a:t>
             </a:fld>
             <a:endParaRPr lang="en-US"/>
           </a:p>
@@ -660,7 +665,7 @@
           <a:p>
             <a:fld id="{8BCF4D5A-B8DA-0B42-B122-40B606B4BD95}" type="datetimeFigureOut">
               <a:rPr lang="en-US" smtClean="0"/>
-              <a:t>2/13/19</a:t>
+              <a:t>5/9/19</a:t>
             </a:fld>
             <a:endParaRPr lang="en-US"/>
           </a:p>
@@ -858,7 +863,7 @@
           <a:p>
             <a:fld id="{8BCF4D5A-B8DA-0B42-B122-40B606B4BD95}" type="datetimeFigureOut">
               <a:rPr lang="en-US" smtClean="0"/>
-              <a:t>2/13/19</a:t>
+              <a:t>5/9/19</a:t>
             </a:fld>
             <a:endParaRPr lang="en-US"/>
           </a:p>
@@ -1133,7 +1138,7 @@
           <a:p>
             <a:fld id="{8BCF4D5A-B8DA-0B42-B122-40B606B4BD95}" type="datetimeFigureOut">
               <a:rPr lang="en-US" smtClean="0"/>
-              <a:t>2/13/19</a:t>
+              <a:t>5/9/19</a:t>
             </a:fld>
             <a:endParaRPr lang="en-US"/>
           </a:p>
@@ -1398,7 +1403,7 @@
           <a:p>
             <a:fld id="{8BCF4D5A-B8DA-0B42-B122-40B606B4BD95}" type="datetimeFigureOut">
               <a:rPr lang="en-US" smtClean="0"/>
-              <a:t>2/13/19</a:t>
+              <a:t>5/9/19</a:t>
             </a:fld>
             <a:endParaRPr lang="en-US"/>
           </a:p>
@@ -1810,7 +1815,7 @@
           <a:p>
             <a:fld id="{8BCF4D5A-B8DA-0B42-B122-40B606B4BD95}" type="datetimeFigureOut">
               <a:rPr lang="en-US" smtClean="0"/>
-              <a:t>2/13/19</a:t>
+              <a:t>5/9/19</a:t>
             </a:fld>
             <a:endParaRPr lang="en-US"/>
           </a:p>
@@ -1951,7 +1956,7 @@
           <a:p>
             <a:fld id="{8BCF4D5A-B8DA-0B42-B122-40B606B4BD95}" type="datetimeFigureOut">
               <a:rPr lang="en-US" smtClean="0"/>
-              <a:t>2/13/19</a:t>
+              <a:t>5/9/19</a:t>
             </a:fld>
             <a:endParaRPr lang="en-US"/>
           </a:p>
@@ -2064,7 +2069,7 @@
           <a:p>
             <a:fld id="{8BCF4D5A-B8DA-0B42-B122-40B606B4BD95}" type="datetimeFigureOut">
               <a:rPr lang="en-US" smtClean="0"/>
-              <a:t>2/13/19</a:t>
+              <a:t>5/9/19</a:t>
             </a:fld>
             <a:endParaRPr lang="en-US"/>
           </a:p>
@@ -2375,7 +2380,7 @@
           <a:p>
             <a:fld id="{8BCF4D5A-B8DA-0B42-B122-40B606B4BD95}" type="datetimeFigureOut">
               <a:rPr lang="en-US" smtClean="0"/>
-              <a:t>2/13/19</a:t>
+              <a:t>5/9/19</a:t>
             </a:fld>
             <a:endParaRPr lang="en-US"/>
           </a:p>
@@ -2663,7 +2668,7 @@
           <a:p>
             <a:fld id="{8BCF4D5A-B8DA-0B42-B122-40B606B4BD95}" type="datetimeFigureOut">
               <a:rPr lang="en-US" smtClean="0"/>
-              <a:t>2/13/19</a:t>
+              <a:t>5/9/19</a:t>
             </a:fld>
             <a:endParaRPr lang="en-US"/>
           </a:p>
@@ -2904,7 +2909,7 @@
           <a:p>
             <a:fld id="{8BCF4D5A-B8DA-0B42-B122-40B606B4BD95}" type="datetimeFigureOut">
               <a:rPr lang="en-US" smtClean="0"/>
-              <a:t>2/13/19</a:t>
+              <a:t>5/9/19</a:t>
             </a:fld>
             <a:endParaRPr lang="en-US"/>
           </a:p>
@@ -3321,713 +3326,872 @@
           <a:chExt cx="0" cy="0"/>
         </a:xfrm>
       </p:grpSpPr>
-      <p:sp>
-        <p:nvSpPr>
-          <p:cNvPr id="4" name="Rectangle 3">
-            <a:extLst>
-              <a:ext uri="{FF2B5EF4-FFF2-40B4-BE49-F238E27FC236}">
-                <a16:creationId xmlns:a16="http://schemas.microsoft.com/office/drawing/2014/main" id="{17A63F93-B1C7-7844-AA7D-A00A3A83BEEB}"/>
-              </a:ext>
-            </a:extLst>
-          </p:cNvPr>
-          <p:cNvSpPr/>
+      <p:grpSp>
+        <p:nvGrpSpPr>
+          <p:cNvPr id="61" name="Group 60">
+            <a:extLst>
+              <a:ext uri="{FF2B5EF4-FFF2-40B4-BE49-F238E27FC236}">
+                <a16:creationId xmlns:a16="http://schemas.microsoft.com/office/drawing/2014/main" id="{0FC8AC65-8FA7-C440-8D34-25E263139B42}"/>
+              </a:ext>
+            </a:extLst>
+          </p:cNvPr>
+          <p:cNvGrpSpPr/>
           <p:nvPr/>
-        </p:nvSpPr>
-        <p:spPr>
+        </p:nvGrpSpPr>
+        <p:grpSpPr>
           <a:xfrm>
-            <a:off x="869211" y="2448731"/>
-            <a:ext cx="1363851" cy="728421"/>
+            <a:off x="869211" y="843134"/>
+            <a:ext cx="10120842" cy="3315440"/>
+            <a:chOff x="869211" y="843134"/>
+            <a:chExt cx="10120842" cy="3315440"/>
           </a:xfrm>
-          <a:prstGeom prst="rect">
-            <a:avLst/>
-          </a:prstGeom>
-          <a:ln w="28575">
-            <a:solidFill>
+        </p:grpSpPr>
+        <p:sp>
+          <p:nvSpPr>
+            <p:cNvPr id="4" name="Rectangle 3">
+              <a:extLst>
+                <a:ext uri="{FF2B5EF4-FFF2-40B4-BE49-F238E27FC236}">
+                  <a16:creationId xmlns:a16="http://schemas.microsoft.com/office/drawing/2014/main" id="{17A63F93-B1C7-7844-AA7D-A00A3A83BEEB}"/>
+                </a:ext>
+              </a:extLst>
+            </p:cNvPr>
+            <p:cNvSpPr/>
+            <p:nvPr/>
+          </p:nvSpPr>
+          <p:spPr>
+            <a:xfrm>
+              <a:off x="869211" y="2448731"/>
+              <a:ext cx="1363851" cy="728421"/>
+            </a:xfrm>
+            <a:prstGeom prst="rect">
+              <a:avLst/>
+            </a:prstGeom>
+            <a:ln w="28575">
+              <a:solidFill>
+                <a:schemeClr val="tx1"/>
+              </a:solidFill>
+            </a:ln>
+          </p:spPr>
+          <p:style>
+            <a:lnRef idx="2">
+              <a:schemeClr val="dk1"/>
+            </a:lnRef>
+            <a:fillRef idx="1">
+              <a:schemeClr val="lt1"/>
+            </a:fillRef>
+            <a:effectRef idx="0">
+              <a:schemeClr val="dk1"/>
+            </a:effectRef>
+            <a:fontRef idx="minor">
+              <a:schemeClr val="dk1"/>
+            </a:fontRef>
+          </p:style>
+          <p:txBody>
+            <a:bodyPr rtlCol="0" anchor="ctr"/>
+            <a:lstStyle/>
+            <a:p>
+              <a:pPr algn="ctr"/>
+              <a:r>
+                <a:rPr lang="en-US" dirty="0"/>
+                <a:t>1-LoadData</a:t>
+              </a:r>
+            </a:p>
+          </p:txBody>
+        </p:sp>
+        <p:sp>
+          <p:nvSpPr>
+            <p:cNvPr id="5" name="Rectangle 4">
+              <a:extLst>
+                <a:ext uri="{FF2B5EF4-FFF2-40B4-BE49-F238E27FC236}">
+                  <a16:creationId xmlns:a16="http://schemas.microsoft.com/office/drawing/2014/main" id="{8368C41A-5FCE-6F42-8D43-EEC15B7FA6D2}"/>
+                </a:ext>
+              </a:extLst>
+            </p:cNvPr>
+            <p:cNvSpPr/>
+            <p:nvPr/>
+          </p:nvSpPr>
+          <p:spPr>
+            <a:xfrm>
+              <a:off x="3100667" y="2448731"/>
+              <a:ext cx="1363851" cy="728421"/>
+            </a:xfrm>
+            <a:prstGeom prst="rect">
+              <a:avLst/>
+            </a:prstGeom>
+            <a:ln w="28575">
+              <a:solidFill>
+                <a:schemeClr val="tx1"/>
+              </a:solidFill>
+            </a:ln>
+          </p:spPr>
+          <p:style>
+            <a:lnRef idx="2">
+              <a:schemeClr val="dk1"/>
+            </a:lnRef>
+            <a:fillRef idx="1">
+              <a:schemeClr val="lt1"/>
+            </a:fillRef>
+            <a:effectRef idx="0">
+              <a:schemeClr val="dk1"/>
+            </a:effectRef>
+            <a:fontRef idx="minor">
+              <a:schemeClr val="dk1"/>
+            </a:fontRef>
+          </p:style>
+          <p:txBody>
+            <a:bodyPr rtlCol="0" anchor="ctr"/>
+            <a:lstStyle/>
+            <a:p>
+              <a:pPr algn="ctr"/>
+              <a:r>
+                <a:rPr lang="en-US" dirty="0"/>
+                <a:t>2-filtering</a:t>
+              </a:r>
+            </a:p>
+          </p:txBody>
+        </p:sp>
+        <p:sp>
+          <p:nvSpPr>
+            <p:cNvPr id="6" name="Rectangle 5">
+              <a:extLst>
+                <a:ext uri="{FF2B5EF4-FFF2-40B4-BE49-F238E27FC236}">
+                  <a16:creationId xmlns:a16="http://schemas.microsoft.com/office/drawing/2014/main" id="{E4F44087-01C6-9148-AA6B-001767AC4009}"/>
+                </a:ext>
+              </a:extLst>
+            </p:cNvPr>
+            <p:cNvSpPr/>
+            <p:nvPr/>
+          </p:nvSpPr>
+          <p:spPr>
+            <a:xfrm>
+              <a:off x="5301088" y="1356098"/>
+              <a:ext cx="1363851" cy="728421"/>
+            </a:xfrm>
+            <a:prstGeom prst="rect">
+              <a:avLst/>
+            </a:prstGeom>
+            <a:ln w="28575">
+              <a:solidFill>
+                <a:schemeClr val="tx1"/>
+              </a:solidFill>
+            </a:ln>
+          </p:spPr>
+          <p:style>
+            <a:lnRef idx="2">
+              <a:schemeClr val="dk1"/>
+            </a:lnRef>
+            <a:fillRef idx="1">
+              <a:schemeClr val="lt1"/>
+            </a:fillRef>
+            <a:effectRef idx="0">
+              <a:schemeClr val="dk1"/>
+            </a:effectRef>
+            <a:fontRef idx="minor">
+              <a:schemeClr val="dk1"/>
+            </a:fontRef>
+          </p:style>
+          <p:txBody>
+            <a:bodyPr rtlCol="0" anchor="ctr"/>
+            <a:lstStyle/>
+            <a:p>
+              <a:pPr algn="ctr"/>
+              <a:r>
+                <a:rPr lang="en-US" dirty="0"/>
+                <a:t>3-zinb</a:t>
+              </a:r>
+            </a:p>
+          </p:txBody>
+        </p:sp>
+        <p:sp>
+          <p:nvSpPr>
+            <p:cNvPr id="7" name="Rectangle 6">
+              <a:extLst>
+                <a:ext uri="{FF2B5EF4-FFF2-40B4-BE49-F238E27FC236}">
+                  <a16:creationId xmlns:a16="http://schemas.microsoft.com/office/drawing/2014/main" id="{3B3B03DB-4977-E14F-93A6-F83CD916C4AA}"/>
+                </a:ext>
+              </a:extLst>
+            </p:cNvPr>
+            <p:cNvSpPr/>
+            <p:nvPr/>
+          </p:nvSpPr>
+          <p:spPr>
+            <a:xfrm>
+              <a:off x="5301092" y="2448730"/>
+              <a:ext cx="1363851" cy="728421"/>
+            </a:xfrm>
+            <a:prstGeom prst="rect">
+              <a:avLst/>
+            </a:prstGeom>
+            <a:ln w="28575">
+              <a:solidFill>
+                <a:schemeClr val="tx1"/>
+              </a:solidFill>
+            </a:ln>
+          </p:spPr>
+          <p:style>
+            <a:lnRef idx="2">
+              <a:schemeClr val="dk1"/>
+            </a:lnRef>
+            <a:fillRef idx="1">
+              <a:schemeClr val="lt1"/>
+            </a:fillRef>
+            <a:effectRef idx="0">
+              <a:schemeClr val="dk1"/>
+            </a:effectRef>
+            <a:fontRef idx="minor">
+              <a:schemeClr val="dk1"/>
+            </a:fontRef>
+          </p:style>
+          <p:txBody>
+            <a:bodyPr rtlCol="0" anchor="ctr"/>
+            <a:lstStyle/>
+            <a:p>
+              <a:pPr algn="ctr"/>
+              <a:r>
+                <a:rPr lang="en-US" dirty="0"/>
+                <a:t>4-sc3</a:t>
+              </a:r>
+            </a:p>
+          </p:txBody>
+        </p:sp>
+        <p:sp>
+          <p:nvSpPr>
+            <p:cNvPr id="8" name="Rectangle 7">
+              <a:extLst>
+                <a:ext uri="{FF2B5EF4-FFF2-40B4-BE49-F238E27FC236}">
+                  <a16:creationId xmlns:a16="http://schemas.microsoft.com/office/drawing/2014/main" id="{00EDB4FC-4720-E348-A6BB-8342794950FB}"/>
+                </a:ext>
+              </a:extLst>
+            </p:cNvPr>
+            <p:cNvSpPr/>
+            <p:nvPr/>
+          </p:nvSpPr>
+          <p:spPr>
+            <a:xfrm>
+              <a:off x="5301088" y="3430153"/>
+              <a:ext cx="1363851" cy="728421"/>
+            </a:xfrm>
+            <a:prstGeom prst="rect">
+              <a:avLst/>
+            </a:prstGeom>
+            <a:ln w="28575">
+              <a:solidFill>
+                <a:schemeClr val="tx1"/>
+              </a:solidFill>
+            </a:ln>
+          </p:spPr>
+          <p:style>
+            <a:lnRef idx="2">
+              <a:schemeClr val="dk1"/>
+            </a:lnRef>
+            <a:fillRef idx="1">
+              <a:schemeClr val="lt1"/>
+            </a:fillRef>
+            <a:effectRef idx="0">
+              <a:schemeClr val="dk1"/>
+            </a:effectRef>
+            <a:fontRef idx="minor">
+              <a:schemeClr val="dk1"/>
+            </a:fontRef>
+          </p:style>
+          <p:txBody>
+            <a:bodyPr rtlCol="0" anchor="ctr"/>
+            <a:lstStyle/>
+            <a:p>
+              <a:pPr algn="ctr"/>
+              <a:r>
+                <a:rPr lang="en-US" dirty="0"/>
+                <a:t>5-seurat</a:t>
+              </a:r>
+            </a:p>
+          </p:txBody>
+        </p:sp>
+        <p:sp>
+          <p:nvSpPr>
+            <p:cNvPr id="9" name="Rectangle 8">
+              <a:extLst>
+                <a:ext uri="{FF2B5EF4-FFF2-40B4-BE49-F238E27FC236}">
+                  <a16:creationId xmlns:a16="http://schemas.microsoft.com/office/drawing/2014/main" id="{3D923191-95EC-394F-899C-1533464527EA}"/>
+                </a:ext>
+              </a:extLst>
+            </p:cNvPr>
+            <p:cNvSpPr/>
+            <p:nvPr/>
+          </p:nvSpPr>
+          <p:spPr>
+            <a:xfrm>
+              <a:off x="9513141" y="2448730"/>
+              <a:ext cx="1476912" cy="728421"/>
+            </a:xfrm>
+            <a:prstGeom prst="rect">
+              <a:avLst/>
+            </a:prstGeom>
+            <a:ln w="28575">
+              <a:solidFill>
+                <a:schemeClr val="tx1"/>
+              </a:solidFill>
+            </a:ln>
+          </p:spPr>
+          <p:style>
+            <a:lnRef idx="2">
+              <a:schemeClr val="dk1"/>
+            </a:lnRef>
+            <a:fillRef idx="1">
+              <a:schemeClr val="lt1"/>
+            </a:fillRef>
+            <a:effectRef idx="0">
+              <a:schemeClr val="dk1"/>
+            </a:effectRef>
+            <a:fontRef idx="minor">
+              <a:schemeClr val="dk1"/>
+            </a:fontRef>
+          </p:style>
+          <p:txBody>
+            <a:bodyPr rtlCol="0" anchor="ctr"/>
+            <a:lstStyle/>
+            <a:p>
+              <a:pPr algn="ctr"/>
+              <a:r>
+                <a:rPr lang="en-US" dirty="0"/>
+                <a:t>8-ConsCluster</a:t>
+              </a:r>
+            </a:p>
+          </p:txBody>
+        </p:sp>
+        <p:sp>
+          <p:nvSpPr>
+            <p:cNvPr id="10" name="Rectangle 9">
+              <a:extLst>
+                <a:ext uri="{FF2B5EF4-FFF2-40B4-BE49-F238E27FC236}">
+                  <a16:creationId xmlns:a16="http://schemas.microsoft.com/office/drawing/2014/main" id="{96DF2FBD-22E2-F846-BA01-32562E2E20ED}"/>
+                </a:ext>
+              </a:extLst>
+            </p:cNvPr>
+            <p:cNvSpPr/>
+            <p:nvPr/>
+          </p:nvSpPr>
+          <p:spPr>
+            <a:xfrm>
+              <a:off x="7114255" y="843134"/>
+              <a:ext cx="1363851" cy="728421"/>
+            </a:xfrm>
+            <a:prstGeom prst="rect">
+              <a:avLst/>
+            </a:prstGeom>
+            <a:ln w="28575">
+              <a:solidFill>
+                <a:schemeClr val="tx1"/>
+              </a:solidFill>
+            </a:ln>
+          </p:spPr>
+          <p:style>
+            <a:lnRef idx="2">
+              <a:schemeClr val="dk1"/>
+            </a:lnRef>
+            <a:fillRef idx="1">
+              <a:schemeClr val="lt1"/>
+            </a:fillRef>
+            <a:effectRef idx="0">
+              <a:schemeClr val="dk1"/>
+            </a:effectRef>
+            <a:fontRef idx="minor">
+              <a:schemeClr val="dk1"/>
+            </a:fontRef>
+          </p:style>
+          <p:txBody>
+            <a:bodyPr rtlCol="0" anchor="ctr"/>
+            <a:lstStyle/>
+            <a:p>
+              <a:pPr algn="ctr"/>
+              <a:r>
+                <a:rPr lang="en-US" dirty="0"/>
+                <a:t>6-Monocle</a:t>
+              </a:r>
+            </a:p>
+          </p:txBody>
+        </p:sp>
+        <p:cxnSp>
+          <p:nvCxnSpPr>
+            <p:cNvPr id="12" name="Straight Arrow Connector 11">
+              <a:extLst>
+                <a:ext uri="{FF2B5EF4-FFF2-40B4-BE49-F238E27FC236}">
+                  <a16:creationId xmlns:a16="http://schemas.microsoft.com/office/drawing/2014/main" id="{9F277E66-DF8F-A04D-9E68-10EFED25E029}"/>
+                </a:ext>
+              </a:extLst>
+            </p:cNvPr>
+            <p:cNvCxnSpPr>
+              <a:stCxn id="4" idx="3"/>
+              <a:endCxn id="5" idx="1"/>
+            </p:cNvCxnSpPr>
+            <p:nvPr/>
+          </p:nvCxnSpPr>
+          <p:spPr>
+            <a:xfrm>
+              <a:off x="2233062" y="2812942"/>
+              <a:ext cx="867605" cy="0"/>
+            </a:xfrm>
+            <a:prstGeom prst="straightConnector1">
+              <a:avLst/>
+            </a:prstGeom>
+            <a:ln w="12700">
+              <a:tailEnd type="triangle"/>
+            </a:ln>
+          </p:spPr>
+          <p:style>
+            <a:lnRef idx="1">
+              <a:schemeClr val="dk1"/>
+            </a:lnRef>
+            <a:fillRef idx="0">
+              <a:schemeClr val="dk1"/>
+            </a:fillRef>
+            <a:effectRef idx="0">
+              <a:schemeClr val="dk1"/>
+            </a:effectRef>
+            <a:fontRef idx="minor">
               <a:schemeClr val="tx1"/>
-            </a:solidFill>
-          </a:ln>
-        </p:spPr>
-        <p:style>
-          <a:lnRef idx="2">
-            <a:schemeClr val="dk1"/>
-          </a:lnRef>
-          <a:fillRef idx="1">
-            <a:schemeClr val="lt1"/>
-          </a:fillRef>
-          <a:effectRef idx="0">
-            <a:schemeClr val="dk1"/>
-          </a:effectRef>
-          <a:fontRef idx="minor">
-            <a:schemeClr val="dk1"/>
-          </a:fontRef>
-        </p:style>
-        <p:txBody>
-          <a:bodyPr rtlCol="0" anchor="ctr"/>
-          <a:lstStyle/>
-          <a:p>
-            <a:pPr algn="ctr"/>
-            <a:r>
-              <a:rPr lang="en-US" dirty="0"/>
-              <a:t>1-LoadData</a:t>
-            </a:r>
-          </a:p>
-        </p:txBody>
-      </p:sp>
-      <p:sp>
-        <p:nvSpPr>
-          <p:cNvPr id="5" name="Rectangle 4">
-            <a:extLst>
-              <a:ext uri="{FF2B5EF4-FFF2-40B4-BE49-F238E27FC236}">
-                <a16:creationId xmlns:a16="http://schemas.microsoft.com/office/drawing/2014/main" id="{8368C41A-5FCE-6F42-8D43-EEC15B7FA6D2}"/>
-              </a:ext>
-            </a:extLst>
-          </p:cNvPr>
-          <p:cNvSpPr/>
-          <p:nvPr/>
-        </p:nvSpPr>
-        <p:spPr>
-          <a:xfrm>
-            <a:off x="3100667" y="2448731"/>
-            <a:ext cx="1363851" cy="728421"/>
-          </a:xfrm>
-          <a:prstGeom prst="rect">
-            <a:avLst/>
-          </a:prstGeom>
-          <a:ln w="28575">
-            <a:solidFill>
+            </a:fontRef>
+          </p:style>
+        </p:cxnSp>
+        <p:cxnSp>
+          <p:nvCxnSpPr>
+            <p:cNvPr id="13" name="Straight Arrow Connector 12">
+              <a:extLst>
+                <a:ext uri="{FF2B5EF4-FFF2-40B4-BE49-F238E27FC236}">
+                  <a16:creationId xmlns:a16="http://schemas.microsoft.com/office/drawing/2014/main" id="{5783B5F9-324D-7946-BB63-67334EA543AA}"/>
+                </a:ext>
+              </a:extLst>
+            </p:cNvPr>
+            <p:cNvCxnSpPr>
+              <a:cxnSpLocks/>
+              <a:stCxn id="5" idx="3"/>
+              <a:endCxn id="7" idx="1"/>
+            </p:cNvCxnSpPr>
+            <p:nvPr/>
+          </p:nvCxnSpPr>
+          <p:spPr>
+            <a:xfrm flipV="1">
+              <a:off x="4464518" y="2812941"/>
+              <a:ext cx="836574" cy="1"/>
+            </a:xfrm>
+            <a:prstGeom prst="straightConnector1">
+              <a:avLst/>
+            </a:prstGeom>
+            <a:ln w="12700">
+              <a:tailEnd type="triangle"/>
+            </a:ln>
+          </p:spPr>
+          <p:style>
+            <a:lnRef idx="1">
+              <a:schemeClr val="dk1"/>
+            </a:lnRef>
+            <a:fillRef idx="0">
+              <a:schemeClr val="dk1"/>
+            </a:fillRef>
+            <a:effectRef idx="0">
+              <a:schemeClr val="dk1"/>
+            </a:effectRef>
+            <a:fontRef idx="minor">
               <a:schemeClr val="tx1"/>
-            </a:solidFill>
-          </a:ln>
-        </p:spPr>
-        <p:style>
-          <a:lnRef idx="2">
-            <a:schemeClr val="dk1"/>
-          </a:lnRef>
-          <a:fillRef idx="1">
-            <a:schemeClr val="lt1"/>
-          </a:fillRef>
-          <a:effectRef idx="0">
-            <a:schemeClr val="dk1"/>
-          </a:effectRef>
-          <a:fontRef idx="minor">
-            <a:schemeClr val="dk1"/>
-          </a:fontRef>
-        </p:style>
-        <p:txBody>
-          <a:bodyPr rtlCol="0" anchor="ctr"/>
-          <a:lstStyle/>
-          <a:p>
-            <a:pPr algn="ctr"/>
-            <a:r>
-              <a:rPr lang="en-US" dirty="0"/>
-              <a:t>2-filtering</a:t>
-            </a:r>
-          </a:p>
-        </p:txBody>
-      </p:sp>
-      <p:sp>
-        <p:nvSpPr>
-          <p:cNvPr id="6" name="Rectangle 5">
-            <a:extLst>
-              <a:ext uri="{FF2B5EF4-FFF2-40B4-BE49-F238E27FC236}">
-                <a16:creationId xmlns:a16="http://schemas.microsoft.com/office/drawing/2014/main" id="{E4F44087-01C6-9148-AA6B-001767AC4009}"/>
-              </a:ext>
-            </a:extLst>
-          </p:cNvPr>
-          <p:cNvSpPr/>
-          <p:nvPr/>
-        </p:nvSpPr>
-        <p:spPr>
-          <a:xfrm>
-            <a:off x="5332123" y="1059486"/>
-            <a:ext cx="1363851" cy="728421"/>
-          </a:xfrm>
-          <a:prstGeom prst="rect">
-            <a:avLst/>
-          </a:prstGeom>
-          <a:ln w="28575">
-            <a:solidFill>
+            </a:fontRef>
+          </p:style>
+        </p:cxnSp>
+        <p:cxnSp>
+          <p:nvCxnSpPr>
+            <p:cNvPr id="14" name="Straight Arrow Connector 13">
+              <a:extLst>
+                <a:ext uri="{FF2B5EF4-FFF2-40B4-BE49-F238E27FC236}">
+                  <a16:creationId xmlns:a16="http://schemas.microsoft.com/office/drawing/2014/main" id="{6200D6A7-5AEF-7D44-BA7C-D036D3C52B56}"/>
+                </a:ext>
+              </a:extLst>
+            </p:cNvPr>
+            <p:cNvCxnSpPr>
+              <a:cxnSpLocks/>
+              <a:stCxn id="5" idx="3"/>
+              <a:endCxn id="6" idx="1"/>
+            </p:cNvCxnSpPr>
+            <p:nvPr/>
+          </p:nvCxnSpPr>
+          <p:spPr>
+            <a:xfrm flipV="1">
+              <a:off x="4464518" y="1720309"/>
+              <a:ext cx="836570" cy="1092633"/>
+            </a:xfrm>
+            <a:prstGeom prst="straightConnector1">
+              <a:avLst/>
+            </a:prstGeom>
+            <a:ln w="12700">
+              <a:tailEnd type="triangle"/>
+            </a:ln>
+          </p:spPr>
+          <p:style>
+            <a:lnRef idx="1">
+              <a:schemeClr val="dk1"/>
+            </a:lnRef>
+            <a:fillRef idx="0">
+              <a:schemeClr val="dk1"/>
+            </a:fillRef>
+            <a:effectRef idx="0">
+              <a:schemeClr val="dk1"/>
+            </a:effectRef>
+            <a:fontRef idx="minor">
               <a:schemeClr val="tx1"/>
-            </a:solidFill>
-          </a:ln>
-        </p:spPr>
-        <p:style>
-          <a:lnRef idx="2">
-            <a:schemeClr val="dk1"/>
-          </a:lnRef>
-          <a:fillRef idx="1">
-            <a:schemeClr val="lt1"/>
-          </a:fillRef>
-          <a:effectRef idx="0">
-            <a:schemeClr val="dk1"/>
-          </a:effectRef>
-          <a:fontRef idx="minor">
-            <a:schemeClr val="dk1"/>
-          </a:fontRef>
-        </p:style>
-        <p:txBody>
-          <a:bodyPr rtlCol="0" anchor="ctr"/>
-          <a:lstStyle/>
-          <a:p>
-            <a:pPr algn="ctr"/>
-            <a:r>
-              <a:rPr lang="en-US" dirty="0"/>
-              <a:t>3-zinb</a:t>
-            </a:r>
-          </a:p>
-        </p:txBody>
-      </p:sp>
-      <p:sp>
-        <p:nvSpPr>
-          <p:cNvPr id="7" name="Rectangle 6">
-            <a:extLst>
-              <a:ext uri="{FF2B5EF4-FFF2-40B4-BE49-F238E27FC236}">
-                <a16:creationId xmlns:a16="http://schemas.microsoft.com/office/drawing/2014/main" id="{3B3B03DB-4977-E14F-93A6-F83CD916C4AA}"/>
-              </a:ext>
-            </a:extLst>
-          </p:cNvPr>
-          <p:cNvSpPr/>
-          <p:nvPr/>
-        </p:nvSpPr>
-        <p:spPr>
-          <a:xfrm>
-            <a:off x="5332122" y="2447834"/>
-            <a:ext cx="1363851" cy="728421"/>
-          </a:xfrm>
-          <a:prstGeom prst="rect">
-            <a:avLst/>
-          </a:prstGeom>
-          <a:ln w="28575">
-            <a:solidFill>
+            </a:fontRef>
+          </p:style>
+        </p:cxnSp>
+        <p:cxnSp>
+          <p:nvCxnSpPr>
+            <p:cNvPr id="15" name="Straight Arrow Connector 14">
+              <a:extLst>
+                <a:ext uri="{FF2B5EF4-FFF2-40B4-BE49-F238E27FC236}">
+                  <a16:creationId xmlns:a16="http://schemas.microsoft.com/office/drawing/2014/main" id="{F042A137-7982-1547-9328-A6780E422AEC}"/>
+                </a:ext>
+              </a:extLst>
+            </p:cNvPr>
+            <p:cNvCxnSpPr>
+              <a:cxnSpLocks/>
+              <a:stCxn id="5" idx="3"/>
+              <a:endCxn id="8" idx="1"/>
+            </p:cNvCxnSpPr>
+            <p:nvPr/>
+          </p:nvCxnSpPr>
+          <p:spPr>
+            <a:xfrm>
+              <a:off x="4464518" y="2812942"/>
+              <a:ext cx="836570" cy="981422"/>
+            </a:xfrm>
+            <a:prstGeom prst="straightConnector1">
+              <a:avLst/>
+            </a:prstGeom>
+            <a:ln w="12700">
+              <a:tailEnd type="triangle"/>
+            </a:ln>
+          </p:spPr>
+          <p:style>
+            <a:lnRef idx="1">
+              <a:schemeClr val="dk1"/>
+            </a:lnRef>
+            <a:fillRef idx="0">
+              <a:schemeClr val="dk1"/>
+            </a:fillRef>
+            <a:effectRef idx="0">
+              <a:schemeClr val="dk1"/>
+            </a:effectRef>
+            <a:fontRef idx="minor">
               <a:schemeClr val="tx1"/>
-            </a:solidFill>
-          </a:ln>
-        </p:spPr>
-        <p:style>
-          <a:lnRef idx="2">
-            <a:schemeClr val="dk1"/>
-          </a:lnRef>
-          <a:fillRef idx="1">
-            <a:schemeClr val="lt1"/>
-          </a:fillRef>
-          <a:effectRef idx="0">
-            <a:schemeClr val="dk1"/>
-          </a:effectRef>
-          <a:fontRef idx="minor">
-            <a:schemeClr val="dk1"/>
-          </a:fontRef>
-        </p:style>
-        <p:txBody>
-          <a:bodyPr rtlCol="0" anchor="ctr"/>
-          <a:lstStyle/>
-          <a:p>
-            <a:pPr algn="ctr"/>
-            <a:r>
-              <a:rPr lang="en-US" dirty="0"/>
-              <a:t>4-sc3</a:t>
-            </a:r>
-          </a:p>
-        </p:txBody>
-      </p:sp>
-      <p:sp>
-        <p:nvSpPr>
-          <p:cNvPr id="8" name="Rectangle 7">
-            <a:extLst>
-              <a:ext uri="{FF2B5EF4-FFF2-40B4-BE49-F238E27FC236}">
-                <a16:creationId xmlns:a16="http://schemas.microsoft.com/office/drawing/2014/main" id="{00EDB4FC-4720-E348-A6BB-8342794950FB}"/>
-              </a:ext>
-            </a:extLst>
-          </p:cNvPr>
-          <p:cNvSpPr/>
-          <p:nvPr/>
-        </p:nvSpPr>
-        <p:spPr>
-          <a:xfrm>
-            <a:off x="5332122" y="3836182"/>
-            <a:ext cx="1363851" cy="728421"/>
-          </a:xfrm>
-          <a:prstGeom prst="rect">
-            <a:avLst/>
-          </a:prstGeom>
-          <a:ln w="28575">
-            <a:solidFill>
+            </a:fontRef>
+          </p:style>
+        </p:cxnSp>
+        <p:cxnSp>
+          <p:nvCxnSpPr>
+            <p:cNvPr id="16" name="Straight Arrow Connector 15">
+              <a:extLst>
+                <a:ext uri="{FF2B5EF4-FFF2-40B4-BE49-F238E27FC236}">
+                  <a16:creationId xmlns:a16="http://schemas.microsoft.com/office/drawing/2014/main" id="{81265658-E517-744C-8D91-71600D2148CA}"/>
+                </a:ext>
+              </a:extLst>
+            </p:cNvPr>
+            <p:cNvCxnSpPr>
+              <a:cxnSpLocks/>
+              <a:stCxn id="7" idx="3"/>
+              <a:endCxn id="9" idx="1"/>
+            </p:cNvCxnSpPr>
+            <p:nvPr/>
+          </p:nvCxnSpPr>
+          <p:spPr>
+            <a:xfrm>
+              <a:off x="6664943" y="2812941"/>
+              <a:ext cx="2848198" cy="0"/>
+            </a:xfrm>
+            <a:prstGeom prst="straightConnector1">
+              <a:avLst/>
+            </a:prstGeom>
+            <a:ln w="12700">
+              <a:tailEnd type="triangle"/>
+            </a:ln>
+          </p:spPr>
+          <p:style>
+            <a:lnRef idx="1">
+              <a:schemeClr val="dk1"/>
+            </a:lnRef>
+            <a:fillRef idx="0">
+              <a:schemeClr val="dk1"/>
+            </a:fillRef>
+            <a:effectRef idx="0">
+              <a:schemeClr val="dk1"/>
+            </a:effectRef>
+            <a:fontRef idx="minor">
               <a:schemeClr val="tx1"/>
-            </a:solidFill>
-          </a:ln>
-        </p:spPr>
-        <p:style>
-          <a:lnRef idx="2">
-            <a:schemeClr val="dk1"/>
-          </a:lnRef>
-          <a:fillRef idx="1">
-            <a:schemeClr val="lt1"/>
-          </a:fillRef>
-          <a:effectRef idx="0">
-            <a:schemeClr val="dk1"/>
-          </a:effectRef>
-          <a:fontRef idx="minor">
-            <a:schemeClr val="dk1"/>
-          </a:fontRef>
-        </p:style>
-        <p:txBody>
-          <a:bodyPr rtlCol="0" anchor="ctr"/>
-          <a:lstStyle/>
-          <a:p>
-            <a:pPr algn="ctr"/>
-            <a:r>
-              <a:rPr lang="en-US" dirty="0"/>
-              <a:t>5-seurat</a:t>
-            </a:r>
-          </a:p>
-        </p:txBody>
-      </p:sp>
-      <p:sp>
-        <p:nvSpPr>
-          <p:cNvPr id="9" name="Rectangle 8">
-            <a:extLst>
-              <a:ext uri="{FF2B5EF4-FFF2-40B4-BE49-F238E27FC236}">
-                <a16:creationId xmlns:a16="http://schemas.microsoft.com/office/drawing/2014/main" id="{3D923191-95EC-394F-899C-1533464527EA}"/>
-              </a:ext>
-            </a:extLst>
-          </p:cNvPr>
-          <p:cNvSpPr/>
-          <p:nvPr/>
-        </p:nvSpPr>
-        <p:spPr>
-          <a:xfrm>
-            <a:off x="7563577" y="2447833"/>
-            <a:ext cx="1363851" cy="728421"/>
-          </a:xfrm>
-          <a:prstGeom prst="rect">
-            <a:avLst/>
-          </a:prstGeom>
-          <a:ln w="28575">
-            <a:solidFill>
+            </a:fontRef>
+          </p:style>
+        </p:cxnSp>
+        <p:cxnSp>
+          <p:nvCxnSpPr>
+            <p:cNvPr id="17" name="Straight Arrow Connector 16">
+              <a:extLst>
+                <a:ext uri="{FF2B5EF4-FFF2-40B4-BE49-F238E27FC236}">
+                  <a16:creationId xmlns:a16="http://schemas.microsoft.com/office/drawing/2014/main" id="{1AA939FE-6CB8-FB48-95D5-994A5C9741E6}"/>
+                </a:ext>
+              </a:extLst>
+            </p:cNvPr>
+            <p:cNvCxnSpPr>
+              <a:cxnSpLocks/>
+              <a:stCxn id="6" idx="3"/>
+              <a:endCxn id="10" idx="1"/>
+            </p:cNvCxnSpPr>
+            <p:nvPr/>
+          </p:nvCxnSpPr>
+          <p:spPr>
+            <a:xfrm flipV="1">
+              <a:off x="6664939" y="1207345"/>
+              <a:ext cx="449316" cy="512964"/>
+            </a:xfrm>
+            <a:prstGeom prst="straightConnector1">
+              <a:avLst/>
+            </a:prstGeom>
+            <a:ln w="12700">
+              <a:tailEnd type="triangle"/>
+            </a:ln>
+          </p:spPr>
+          <p:style>
+            <a:lnRef idx="1">
+              <a:schemeClr val="dk1"/>
+            </a:lnRef>
+            <a:fillRef idx="0">
+              <a:schemeClr val="dk1"/>
+            </a:fillRef>
+            <a:effectRef idx="0">
+              <a:schemeClr val="dk1"/>
+            </a:effectRef>
+            <a:fontRef idx="minor">
               <a:schemeClr val="tx1"/>
-            </a:solidFill>
-          </a:ln>
-        </p:spPr>
-        <p:style>
-          <a:lnRef idx="2">
-            <a:schemeClr val="dk1"/>
-          </a:lnRef>
-          <a:fillRef idx="1">
-            <a:schemeClr val="lt1"/>
-          </a:fillRef>
-          <a:effectRef idx="0">
-            <a:schemeClr val="dk1"/>
-          </a:effectRef>
-          <a:fontRef idx="minor">
-            <a:schemeClr val="dk1"/>
-          </a:fontRef>
-        </p:style>
-        <p:txBody>
-          <a:bodyPr rtlCol="0" anchor="ctr"/>
-          <a:lstStyle/>
-          <a:p>
-            <a:pPr algn="ctr"/>
-            <a:r>
-              <a:rPr lang="en-US" dirty="0"/>
-              <a:t>7-ConsCluster</a:t>
-            </a:r>
-          </a:p>
-        </p:txBody>
-      </p:sp>
-      <p:sp>
-        <p:nvSpPr>
-          <p:cNvPr id="10" name="Rectangle 9">
-            <a:extLst>
-              <a:ext uri="{FF2B5EF4-FFF2-40B4-BE49-F238E27FC236}">
-                <a16:creationId xmlns:a16="http://schemas.microsoft.com/office/drawing/2014/main" id="{96DF2FBD-22E2-F846-BA01-32562E2E20ED}"/>
-              </a:ext>
-            </a:extLst>
-          </p:cNvPr>
-          <p:cNvSpPr/>
-          <p:nvPr/>
-        </p:nvSpPr>
-        <p:spPr>
-          <a:xfrm>
-            <a:off x="7563579" y="1059485"/>
-            <a:ext cx="1363851" cy="728421"/>
-          </a:xfrm>
-          <a:prstGeom prst="rect">
-            <a:avLst/>
-          </a:prstGeom>
-          <a:ln w="28575">
-            <a:solidFill>
+            </a:fontRef>
+          </p:style>
+        </p:cxnSp>
+        <p:cxnSp>
+          <p:nvCxnSpPr>
+            <p:cNvPr id="30" name="Straight Arrow Connector 29">
+              <a:extLst>
+                <a:ext uri="{FF2B5EF4-FFF2-40B4-BE49-F238E27FC236}">
+                  <a16:creationId xmlns:a16="http://schemas.microsoft.com/office/drawing/2014/main" id="{55E18592-9D39-3843-A143-C15B71395213}"/>
+                </a:ext>
+              </a:extLst>
+            </p:cNvPr>
+            <p:cNvCxnSpPr>
+              <a:cxnSpLocks/>
+              <a:stCxn id="8" idx="3"/>
+              <a:endCxn id="9" idx="1"/>
+            </p:cNvCxnSpPr>
+            <p:nvPr/>
+          </p:nvCxnSpPr>
+          <p:spPr>
+            <a:xfrm flipV="1">
+              <a:off x="6664939" y="2812941"/>
+              <a:ext cx="2848202" cy="981423"/>
+            </a:xfrm>
+            <a:prstGeom prst="straightConnector1">
+              <a:avLst/>
+            </a:prstGeom>
+            <a:ln w="12700">
+              <a:tailEnd type="triangle"/>
+            </a:ln>
+          </p:spPr>
+          <p:style>
+            <a:lnRef idx="1">
+              <a:schemeClr val="dk1"/>
+            </a:lnRef>
+            <a:fillRef idx="0">
+              <a:schemeClr val="dk1"/>
+            </a:fillRef>
+            <a:effectRef idx="0">
+              <a:schemeClr val="dk1"/>
+            </a:effectRef>
+            <a:fontRef idx="minor">
               <a:schemeClr val="tx1"/>
-            </a:solidFill>
-          </a:ln>
-        </p:spPr>
-        <p:style>
-          <a:lnRef idx="2">
-            <a:schemeClr val="dk1"/>
-          </a:lnRef>
-          <a:fillRef idx="1">
-            <a:schemeClr val="lt1"/>
-          </a:fillRef>
-          <a:effectRef idx="0">
-            <a:schemeClr val="dk1"/>
-          </a:effectRef>
-          <a:fontRef idx="minor">
-            <a:schemeClr val="dk1"/>
-          </a:fontRef>
-        </p:style>
-        <p:txBody>
-          <a:bodyPr rtlCol="0" anchor="ctr"/>
-          <a:lstStyle/>
-          <a:p>
-            <a:pPr algn="ctr"/>
-            <a:r>
-              <a:rPr lang="en-US" dirty="0"/>
-              <a:t>6-RSEC</a:t>
-            </a:r>
-          </a:p>
-        </p:txBody>
-      </p:sp>
-      <p:cxnSp>
-        <p:nvCxnSpPr>
-          <p:cNvPr id="12" name="Straight Arrow Connector 11">
-            <a:extLst>
-              <a:ext uri="{FF2B5EF4-FFF2-40B4-BE49-F238E27FC236}">
-                <a16:creationId xmlns:a16="http://schemas.microsoft.com/office/drawing/2014/main" id="{9F277E66-DF8F-A04D-9E68-10EFED25E029}"/>
-              </a:ext>
-            </a:extLst>
-          </p:cNvPr>
-          <p:cNvCxnSpPr>
-            <a:stCxn id="4" idx="3"/>
-            <a:endCxn id="5" idx="1"/>
-          </p:cNvCxnSpPr>
-          <p:nvPr/>
-        </p:nvCxnSpPr>
-        <p:spPr>
-          <a:xfrm>
-            <a:off x="2233062" y="2812942"/>
-            <a:ext cx="867605" cy="0"/>
-          </a:xfrm>
-          <a:prstGeom prst="straightConnector1">
-            <a:avLst/>
-          </a:prstGeom>
-          <a:ln w="12700">
-            <a:tailEnd type="triangle"/>
-          </a:ln>
-        </p:spPr>
-        <p:style>
-          <a:lnRef idx="1">
-            <a:schemeClr val="dk1"/>
-          </a:lnRef>
-          <a:fillRef idx="0">
-            <a:schemeClr val="dk1"/>
-          </a:fillRef>
-          <a:effectRef idx="0">
-            <a:schemeClr val="dk1"/>
-          </a:effectRef>
-          <a:fontRef idx="minor">
-            <a:schemeClr val="tx1"/>
-          </a:fontRef>
-        </p:style>
-      </p:cxnSp>
-      <p:cxnSp>
-        <p:nvCxnSpPr>
-          <p:cNvPr id="13" name="Straight Arrow Connector 12">
-            <a:extLst>
-              <a:ext uri="{FF2B5EF4-FFF2-40B4-BE49-F238E27FC236}">
-                <a16:creationId xmlns:a16="http://schemas.microsoft.com/office/drawing/2014/main" id="{5783B5F9-324D-7946-BB63-67334EA543AA}"/>
-              </a:ext>
-            </a:extLst>
-          </p:cNvPr>
-          <p:cNvCxnSpPr>
-            <a:cxnSpLocks/>
-            <a:stCxn id="5" idx="3"/>
-            <a:endCxn id="7" idx="1"/>
-          </p:cNvCxnSpPr>
-          <p:nvPr/>
-        </p:nvCxnSpPr>
-        <p:spPr>
-          <a:xfrm flipV="1">
-            <a:off x="4464518" y="2812045"/>
-            <a:ext cx="867604" cy="897"/>
-          </a:xfrm>
-          <a:prstGeom prst="straightConnector1">
-            <a:avLst/>
-          </a:prstGeom>
-          <a:ln w="12700">
-            <a:tailEnd type="triangle"/>
-          </a:ln>
-        </p:spPr>
-        <p:style>
-          <a:lnRef idx="1">
-            <a:schemeClr val="dk1"/>
-          </a:lnRef>
-          <a:fillRef idx="0">
-            <a:schemeClr val="dk1"/>
-          </a:fillRef>
-          <a:effectRef idx="0">
-            <a:schemeClr val="dk1"/>
-          </a:effectRef>
-          <a:fontRef idx="minor">
-            <a:schemeClr val="tx1"/>
-          </a:fontRef>
-        </p:style>
-      </p:cxnSp>
-      <p:cxnSp>
-        <p:nvCxnSpPr>
-          <p:cNvPr id="14" name="Straight Arrow Connector 13">
-            <a:extLst>
-              <a:ext uri="{FF2B5EF4-FFF2-40B4-BE49-F238E27FC236}">
-                <a16:creationId xmlns:a16="http://schemas.microsoft.com/office/drawing/2014/main" id="{6200D6A7-5AEF-7D44-BA7C-D036D3C52B56}"/>
-              </a:ext>
-            </a:extLst>
-          </p:cNvPr>
-          <p:cNvCxnSpPr>
-            <a:cxnSpLocks/>
-            <a:stCxn id="5" idx="3"/>
-            <a:endCxn id="6" idx="1"/>
-          </p:cNvCxnSpPr>
-          <p:nvPr/>
-        </p:nvCxnSpPr>
-        <p:spPr>
-          <a:xfrm flipV="1">
-            <a:off x="4464518" y="1423697"/>
-            <a:ext cx="867605" cy="1389245"/>
-          </a:xfrm>
-          <a:prstGeom prst="straightConnector1">
-            <a:avLst/>
-          </a:prstGeom>
-          <a:ln w="12700">
-            <a:tailEnd type="triangle"/>
-          </a:ln>
-        </p:spPr>
-        <p:style>
-          <a:lnRef idx="1">
-            <a:schemeClr val="dk1"/>
-          </a:lnRef>
-          <a:fillRef idx="0">
-            <a:schemeClr val="dk1"/>
-          </a:fillRef>
-          <a:effectRef idx="0">
-            <a:schemeClr val="dk1"/>
-          </a:effectRef>
-          <a:fontRef idx="minor">
-            <a:schemeClr val="tx1"/>
-          </a:fontRef>
-        </p:style>
-      </p:cxnSp>
-      <p:cxnSp>
-        <p:nvCxnSpPr>
-          <p:cNvPr id="15" name="Straight Arrow Connector 14">
-            <a:extLst>
-              <a:ext uri="{FF2B5EF4-FFF2-40B4-BE49-F238E27FC236}">
-                <a16:creationId xmlns:a16="http://schemas.microsoft.com/office/drawing/2014/main" id="{F042A137-7982-1547-9328-A6780E422AEC}"/>
-              </a:ext>
-            </a:extLst>
-          </p:cNvPr>
-          <p:cNvCxnSpPr>
-            <a:cxnSpLocks/>
-            <a:stCxn id="5" idx="3"/>
-            <a:endCxn id="8" idx="1"/>
-          </p:cNvCxnSpPr>
-          <p:nvPr/>
-        </p:nvCxnSpPr>
-        <p:spPr>
-          <a:xfrm>
-            <a:off x="4464518" y="2812942"/>
-            <a:ext cx="867604" cy="1387451"/>
-          </a:xfrm>
-          <a:prstGeom prst="straightConnector1">
-            <a:avLst/>
-          </a:prstGeom>
-          <a:ln w="12700">
-            <a:tailEnd type="triangle"/>
-          </a:ln>
-        </p:spPr>
-        <p:style>
-          <a:lnRef idx="1">
-            <a:schemeClr val="dk1"/>
-          </a:lnRef>
-          <a:fillRef idx="0">
-            <a:schemeClr val="dk1"/>
-          </a:fillRef>
-          <a:effectRef idx="0">
-            <a:schemeClr val="dk1"/>
-          </a:effectRef>
-          <a:fontRef idx="minor">
-            <a:schemeClr val="tx1"/>
-          </a:fontRef>
-        </p:style>
-      </p:cxnSp>
-      <p:cxnSp>
-        <p:nvCxnSpPr>
-          <p:cNvPr id="16" name="Straight Arrow Connector 15">
-            <a:extLst>
-              <a:ext uri="{FF2B5EF4-FFF2-40B4-BE49-F238E27FC236}">
-                <a16:creationId xmlns:a16="http://schemas.microsoft.com/office/drawing/2014/main" id="{81265658-E517-744C-8D91-71600D2148CA}"/>
-              </a:ext>
-            </a:extLst>
-          </p:cNvPr>
-          <p:cNvCxnSpPr>
-            <a:cxnSpLocks/>
-            <a:stCxn id="7" idx="3"/>
-            <a:endCxn id="9" idx="1"/>
-          </p:cNvCxnSpPr>
-          <p:nvPr/>
-        </p:nvCxnSpPr>
-        <p:spPr>
-          <a:xfrm flipV="1">
-            <a:off x="6695973" y="2812044"/>
-            <a:ext cx="867604" cy="1"/>
-          </a:xfrm>
-          <a:prstGeom prst="straightConnector1">
-            <a:avLst/>
-          </a:prstGeom>
-          <a:ln w="12700">
-            <a:tailEnd type="triangle"/>
-          </a:ln>
-        </p:spPr>
-        <p:style>
-          <a:lnRef idx="1">
-            <a:schemeClr val="dk1"/>
-          </a:lnRef>
-          <a:fillRef idx="0">
-            <a:schemeClr val="dk1"/>
-          </a:fillRef>
-          <a:effectRef idx="0">
-            <a:schemeClr val="dk1"/>
-          </a:effectRef>
-          <a:fontRef idx="minor">
-            <a:schemeClr val="tx1"/>
-          </a:fontRef>
-        </p:style>
-      </p:cxnSp>
-      <p:cxnSp>
-        <p:nvCxnSpPr>
-          <p:cNvPr id="17" name="Straight Arrow Connector 16">
-            <a:extLst>
-              <a:ext uri="{FF2B5EF4-FFF2-40B4-BE49-F238E27FC236}">
-                <a16:creationId xmlns:a16="http://schemas.microsoft.com/office/drawing/2014/main" id="{1AA939FE-6CB8-FB48-95D5-994A5C9741E6}"/>
-              </a:ext>
-            </a:extLst>
-          </p:cNvPr>
-          <p:cNvCxnSpPr>
-            <a:cxnSpLocks/>
-            <a:stCxn id="6" idx="3"/>
-            <a:endCxn id="10" idx="1"/>
-          </p:cNvCxnSpPr>
-          <p:nvPr/>
-        </p:nvCxnSpPr>
-        <p:spPr>
-          <a:xfrm flipV="1">
-            <a:off x="6695974" y="1423696"/>
-            <a:ext cx="867605" cy="1"/>
-          </a:xfrm>
-          <a:prstGeom prst="straightConnector1">
-            <a:avLst/>
-          </a:prstGeom>
-          <a:ln w="12700">
-            <a:tailEnd type="triangle"/>
-          </a:ln>
-        </p:spPr>
-        <p:style>
-          <a:lnRef idx="1">
-            <a:schemeClr val="dk1"/>
-          </a:lnRef>
-          <a:fillRef idx="0">
-            <a:schemeClr val="dk1"/>
-          </a:fillRef>
-          <a:effectRef idx="0">
-            <a:schemeClr val="dk1"/>
-          </a:effectRef>
-          <a:fontRef idx="minor">
-            <a:schemeClr val="tx1"/>
-          </a:fontRef>
-        </p:style>
-      </p:cxnSp>
-      <p:cxnSp>
-        <p:nvCxnSpPr>
-          <p:cNvPr id="30" name="Straight Arrow Connector 29">
-            <a:extLst>
-              <a:ext uri="{FF2B5EF4-FFF2-40B4-BE49-F238E27FC236}">
-                <a16:creationId xmlns:a16="http://schemas.microsoft.com/office/drawing/2014/main" id="{55E18592-9D39-3843-A143-C15B71395213}"/>
-              </a:ext>
-            </a:extLst>
-          </p:cNvPr>
-          <p:cNvCxnSpPr>
-            <a:cxnSpLocks/>
-            <a:stCxn id="8" idx="3"/>
-            <a:endCxn id="9" idx="2"/>
-          </p:cNvCxnSpPr>
-          <p:nvPr/>
-        </p:nvCxnSpPr>
-        <p:spPr>
-          <a:xfrm flipV="1">
-            <a:off x="6695973" y="3176254"/>
-            <a:ext cx="1549530" cy="1024139"/>
-          </a:xfrm>
-          <a:prstGeom prst="straightConnector1">
-            <a:avLst/>
-          </a:prstGeom>
-          <a:ln w="12700">
-            <a:tailEnd type="triangle"/>
-          </a:ln>
-        </p:spPr>
-        <p:style>
-          <a:lnRef idx="1">
-            <a:schemeClr val="dk1"/>
-          </a:lnRef>
-          <a:fillRef idx="0">
-            <a:schemeClr val="dk1"/>
-          </a:fillRef>
-          <a:effectRef idx="0">
-            <a:schemeClr val="dk1"/>
-          </a:effectRef>
-          <a:fontRef idx="minor">
-            <a:schemeClr val="tx1"/>
-          </a:fontRef>
-        </p:style>
-      </p:cxnSp>
-      <p:cxnSp>
-        <p:nvCxnSpPr>
-          <p:cNvPr id="31" name="Straight Arrow Connector 30">
-            <a:extLst>
-              <a:ext uri="{FF2B5EF4-FFF2-40B4-BE49-F238E27FC236}">
-                <a16:creationId xmlns:a16="http://schemas.microsoft.com/office/drawing/2014/main" id="{F383A80F-D87C-6D4D-BEA7-61E31AE0D13A}"/>
-              </a:ext>
-            </a:extLst>
-          </p:cNvPr>
-          <p:cNvCxnSpPr>
-            <a:cxnSpLocks/>
-            <a:stCxn id="10" idx="2"/>
-            <a:endCxn id="9" idx="0"/>
-          </p:cNvCxnSpPr>
-          <p:nvPr/>
-        </p:nvCxnSpPr>
-        <p:spPr>
-          <a:xfrm flipH="1">
-            <a:off x="8245503" y="1787906"/>
-            <a:ext cx="2" cy="659927"/>
-          </a:xfrm>
-          <a:prstGeom prst="straightConnector1">
-            <a:avLst/>
-          </a:prstGeom>
-          <a:ln w="12700">
-            <a:tailEnd type="triangle"/>
-          </a:ln>
-        </p:spPr>
-        <p:style>
-          <a:lnRef idx="1">
-            <a:schemeClr val="dk1"/>
-          </a:lnRef>
-          <a:fillRef idx="0">
-            <a:schemeClr val="dk1"/>
-          </a:fillRef>
-          <a:effectRef idx="0">
-            <a:schemeClr val="dk1"/>
-          </a:effectRef>
-          <a:fontRef idx="minor">
-            <a:schemeClr val="tx1"/>
-          </a:fontRef>
-        </p:style>
-      </p:cxnSp>
+            </a:fontRef>
+          </p:style>
+        </p:cxnSp>
+        <p:cxnSp>
+          <p:nvCxnSpPr>
+            <p:cNvPr id="31" name="Straight Arrow Connector 30">
+              <a:extLst>
+                <a:ext uri="{FF2B5EF4-FFF2-40B4-BE49-F238E27FC236}">
+                  <a16:creationId xmlns:a16="http://schemas.microsoft.com/office/drawing/2014/main" id="{F383A80F-D87C-6D4D-BEA7-61E31AE0D13A}"/>
+                </a:ext>
+              </a:extLst>
+            </p:cNvPr>
+            <p:cNvCxnSpPr>
+              <a:cxnSpLocks/>
+              <a:stCxn id="10" idx="3"/>
+              <a:endCxn id="9" idx="1"/>
+            </p:cNvCxnSpPr>
+            <p:nvPr/>
+          </p:nvCxnSpPr>
+          <p:spPr>
+            <a:xfrm>
+              <a:off x="8478106" y="1207345"/>
+              <a:ext cx="1035035" cy="1605596"/>
+            </a:xfrm>
+            <a:prstGeom prst="straightConnector1">
+              <a:avLst/>
+            </a:prstGeom>
+            <a:ln w="12700">
+              <a:tailEnd type="triangle"/>
+            </a:ln>
+          </p:spPr>
+          <p:style>
+            <a:lnRef idx="1">
+              <a:schemeClr val="dk1"/>
+            </a:lnRef>
+            <a:fillRef idx="0">
+              <a:schemeClr val="dk1"/>
+            </a:fillRef>
+            <a:effectRef idx="0">
+              <a:schemeClr val="dk1"/>
+            </a:effectRef>
+            <a:fontRef idx="minor">
+              <a:schemeClr val="tx1"/>
+            </a:fontRef>
+          </p:style>
+        </p:cxnSp>
+        <p:sp>
+          <p:nvSpPr>
+            <p:cNvPr id="35" name="Rectangle 34">
+              <a:extLst>
+                <a:ext uri="{FF2B5EF4-FFF2-40B4-BE49-F238E27FC236}">
+                  <a16:creationId xmlns:a16="http://schemas.microsoft.com/office/drawing/2014/main" id="{10840E6B-AD10-D24C-B64B-35DD94982196}"/>
+                </a:ext>
+              </a:extLst>
+            </p:cNvPr>
+            <p:cNvSpPr/>
+            <p:nvPr/>
+          </p:nvSpPr>
+          <p:spPr>
+            <a:xfrm>
+              <a:off x="7114255" y="1841420"/>
+              <a:ext cx="1363851" cy="728421"/>
+            </a:xfrm>
+            <a:prstGeom prst="rect">
+              <a:avLst/>
+            </a:prstGeom>
+            <a:ln w="28575">
+              <a:solidFill>
+                <a:schemeClr val="tx1"/>
+              </a:solidFill>
+            </a:ln>
+          </p:spPr>
+          <p:style>
+            <a:lnRef idx="2">
+              <a:schemeClr val="dk1"/>
+            </a:lnRef>
+            <a:fillRef idx="1">
+              <a:schemeClr val="lt1"/>
+            </a:fillRef>
+            <a:effectRef idx="0">
+              <a:schemeClr val="dk1"/>
+            </a:effectRef>
+            <a:fontRef idx="minor">
+              <a:schemeClr val="dk1"/>
+            </a:fontRef>
+          </p:style>
+          <p:txBody>
+            <a:bodyPr rtlCol="0" anchor="ctr"/>
+            <a:lstStyle/>
+            <a:p>
+              <a:pPr algn="ctr"/>
+              <a:r>
+                <a:rPr lang="en-US" dirty="0"/>
+                <a:t>7-RSEC</a:t>
+              </a:r>
+            </a:p>
+          </p:txBody>
+        </p:sp>
+        <p:cxnSp>
+          <p:nvCxnSpPr>
+            <p:cNvPr id="36" name="Straight Arrow Connector 35">
+              <a:extLst>
+                <a:ext uri="{FF2B5EF4-FFF2-40B4-BE49-F238E27FC236}">
+                  <a16:creationId xmlns:a16="http://schemas.microsoft.com/office/drawing/2014/main" id="{BFE4039E-9162-2E4B-8BCA-61E2E8640A1A}"/>
+                </a:ext>
+              </a:extLst>
+            </p:cNvPr>
+            <p:cNvCxnSpPr>
+              <a:cxnSpLocks/>
+              <a:stCxn id="6" idx="3"/>
+              <a:endCxn id="35" idx="1"/>
+            </p:cNvCxnSpPr>
+            <p:nvPr/>
+          </p:nvCxnSpPr>
+          <p:spPr>
+            <a:xfrm>
+              <a:off x="6664939" y="1720309"/>
+              <a:ext cx="449316" cy="485322"/>
+            </a:xfrm>
+            <a:prstGeom prst="straightConnector1">
+              <a:avLst/>
+            </a:prstGeom>
+            <a:ln w="12700">
+              <a:tailEnd type="triangle"/>
+            </a:ln>
+          </p:spPr>
+          <p:style>
+            <a:lnRef idx="1">
+              <a:schemeClr val="dk1"/>
+            </a:lnRef>
+            <a:fillRef idx="0">
+              <a:schemeClr val="dk1"/>
+            </a:fillRef>
+            <a:effectRef idx="0">
+              <a:schemeClr val="dk1"/>
+            </a:effectRef>
+            <a:fontRef idx="minor">
+              <a:schemeClr val="tx1"/>
+            </a:fontRef>
+          </p:style>
+        </p:cxnSp>
+        <p:cxnSp>
+          <p:nvCxnSpPr>
+            <p:cNvPr id="56" name="Straight Arrow Connector 55">
+              <a:extLst>
+                <a:ext uri="{FF2B5EF4-FFF2-40B4-BE49-F238E27FC236}">
+                  <a16:creationId xmlns:a16="http://schemas.microsoft.com/office/drawing/2014/main" id="{F76D8130-D921-7041-ADCD-66DD985B6222}"/>
+                </a:ext>
+              </a:extLst>
+            </p:cNvPr>
+            <p:cNvCxnSpPr>
+              <a:cxnSpLocks/>
+              <a:stCxn id="35" idx="3"/>
+              <a:endCxn id="9" idx="1"/>
+            </p:cNvCxnSpPr>
+            <p:nvPr/>
+          </p:nvCxnSpPr>
+          <p:spPr>
+            <a:xfrm>
+              <a:off x="8478106" y="2205631"/>
+              <a:ext cx="1035035" cy="607310"/>
+            </a:xfrm>
+            <a:prstGeom prst="straightConnector1">
+              <a:avLst/>
+            </a:prstGeom>
+            <a:ln w="12700">
+              <a:tailEnd type="triangle"/>
+            </a:ln>
+          </p:spPr>
+          <p:style>
+            <a:lnRef idx="1">
+              <a:schemeClr val="dk1"/>
+            </a:lnRef>
+            <a:fillRef idx="0">
+              <a:schemeClr val="dk1"/>
+            </a:fillRef>
+            <a:effectRef idx="0">
+              <a:schemeClr val="dk1"/>
+            </a:effectRef>
+            <a:fontRef idx="minor">
+              <a:schemeClr val="tx1"/>
+            </a:fontRef>
+          </p:style>
+        </p:cxnSp>
+      </p:grpSp>
     </p:spTree>
     <p:extLst>
       <p:ext uri="{BB962C8B-B14F-4D97-AF65-F5344CB8AC3E}">

</xml_diff>